<commit_message>
Updated datapath and control block
Datapath should be finalized now, need to ask prof about
	-ALU overflow, underflow
	-DISP block

Signed-off-by: Syncla <vvazir@udel.edu>
</commit_message>
<xml_diff>
--- a/lab3/Datapath Presentation.pptx
+++ b/lab3/Datapath Presentation.pptx
@@ -7,7 +7,8 @@
   <p:sldIdLst>
     <p:sldId id="256" r:id="rId2"/>
     <p:sldId id="257" r:id="rId3"/>
-    <p:sldId id="258" r:id="rId4"/>
+    <p:sldId id="259" r:id="rId4"/>
+    <p:sldId id="258" r:id="rId5"/>
   </p:sldIdLst>
   <p:sldSz cx="12192000" cy="6858000"/>
   <p:notesSz cx="6858000" cy="9144000"/>
@@ -106,6 +107,11 @@
       </a:defRPr>
     </a:lvl9pPr>
   </p:defaultTextStyle>
+  <p:extLst>
+    <p:ext uri="{EFAFB233-063F-42B5-8137-9DF3F51BA10A}">
+      <p15:sldGuideLst xmlns:p15="http://schemas.microsoft.com/office/powerpoint/2012/main"/>
+    </p:ext>
+  </p:extLst>
 </p:presentation>
 </file>
 
@@ -279,7 +285,7 @@
           <a:p>
             <a:fld id="{D1407C4A-7E44-4EF4-ACA2-E29F9BF7E803}" type="datetimeFigureOut">
               <a:rPr lang="en-US" smtClean="0"/>
-              <a:t>4/15/2018</a:t>
+              <a:t>4/16/2018</a:t>
             </a:fld>
             <a:endParaRPr lang="en-US"/>
           </a:p>
@@ -571,7 +577,7 @@
           <a:p>
             <a:fld id="{D1407C4A-7E44-4EF4-ACA2-E29F9BF7E803}" type="datetimeFigureOut">
               <a:rPr lang="en-US" smtClean="0"/>
-              <a:t>4/15/2018</a:t>
+              <a:t>4/16/2018</a:t>
             </a:fld>
             <a:endParaRPr lang="en-US"/>
           </a:p>
@@ -763,7 +769,7 @@
           <a:p>
             <a:fld id="{D1407C4A-7E44-4EF4-ACA2-E29F9BF7E803}" type="datetimeFigureOut">
               <a:rPr lang="en-US" smtClean="0"/>
-              <a:t>4/15/2018</a:t>
+              <a:t>4/16/2018</a:t>
             </a:fld>
             <a:endParaRPr lang="en-US"/>
           </a:p>
@@ -1024,7 +1030,7 @@
           <a:p>
             <a:fld id="{D1407C4A-7E44-4EF4-ACA2-E29F9BF7E803}" type="datetimeFigureOut">
               <a:rPr lang="en-US" smtClean="0"/>
-              <a:t>4/15/2018</a:t>
+              <a:t>4/16/2018</a:t>
             </a:fld>
             <a:endParaRPr lang="en-US"/>
           </a:p>
@@ -1448,7 +1454,7 @@
           <a:p>
             <a:fld id="{D1407C4A-7E44-4EF4-ACA2-E29F9BF7E803}" type="datetimeFigureOut">
               <a:rPr lang="en-US" smtClean="0"/>
-              <a:t>4/15/2018</a:t>
+              <a:t>4/16/2018</a:t>
             </a:fld>
             <a:endParaRPr lang="en-US"/>
           </a:p>
@@ -1994,7 +2000,7 @@
           <a:p>
             <a:fld id="{D1407C4A-7E44-4EF4-ACA2-E29F9BF7E803}" type="datetimeFigureOut">
               <a:rPr lang="en-US" smtClean="0"/>
-              <a:t>4/15/2018</a:t>
+              <a:t>4/16/2018</a:t>
             </a:fld>
             <a:endParaRPr lang="en-US"/>
           </a:p>
@@ -2834,7 +2840,7 @@
           <a:p>
             <a:fld id="{D1407C4A-7E44-4EF4-ACA2-E29F9BF7E803}" type="datetimeFigureOut">
               <a:rPr lang="en-US" smtClean="0"/>
-              <a:t>4/15/2018</a:t>
+              <a:t>4/16/2018</a:t>
             </a:fld>
             <a:endParaRPr lang="en-US"/>
           </a:p>
@@ -3004,7 +3010,7 @@
           <a:p>
             <a:fld id="{D1407C4A-7E44-4EF4-ACA2-E29F9BF7E803}" type="datetimeFigureOut">
               <a:rPr lang="en-US" smtClean="0"/>
-              <a:t>4/15/2018</a:t>
+              <a:t>4/16/2018</a:t>
             </a:fld>
             <a:endParaRPr lang="en-US"/>
           </a:p>
@@ -3188,7 +3194,7 @@
           <a:p>
             <a:fld id="{D1407C4A-7E44-4EF4-ACA2-E29F9BF7E803}" type="datetimeFigureOut">
               <a:rPr lang="en-US" smtClean="0"/>
-              <a:t>4/15/2018</a:t>
+              <a:t>4/16/2018</a:t>
             </a:fld>
             <a:endParaRPr lang="en-US"/>
           </a:p>
@@ -3363,7 +3369,7 @@
           <a:p>
             <a:fld id="{D1407C4A-7E44-4EF4-ACA2-E29F9BF7E803}" type="datetimeFigureOut">
               <a:rPr lang="en-US" smtClean="0"/>
-              <a:t>4/15/2018</a:t>
+              <a:t>4/16/2018</a:t>
             </a:fld>
             <a:endParaRPr lang="en-US"/>
           </a:p>
@@ -3611,7 +3617,7 @@
           <a:p>
             <a:fld id="{D1407C4A-7E44-4EF4-ACA2-E29F9BF7E803}" type="datetimeFigureOut">
               <a:rPr lang="en-US" smtClean="0"/>
-              <a:t>4/15/2018</a:t>
+              <a:t>4/16/2018</a:t>
             </a:fld>
             <a:endParaRPr lang="en-US"/>
           </a:p>
@@ -3853,7 +3859,7 @@
           <a:p>
             <a:fld id="{D1407C4A-7E44-4EF4-ACA2-E29F9BF7E803}" type="datetimeFigureOut">
               <a:rPr lang="en-US" smtClean="0"/>
-              <a:t>4/15/2018</a:t>
+              <a:t>4/16/2018</a:t>
             </a:fld>
             <a:endParaRPr lang="en-US"/>
           </a:p>
@@ -4226,7 +4232,7 @@
           <a:p>
             <a:fld id="{D1407C4A-7E44-4EF4-ACA2-E29F9BF7E803}" type="datetimeFigureOut">
               <a:rPr lang="en-US" smtClean="0"/>
-              <a:t>4/15/2018</a:t>
+              <a:t>4/16/2018</a:t>
             </a:fld>
             <a:endParaRPr lang="en-US"/>
           </a:p>
@@ -4344,7 +4350,7 @@
           <a:p>
             <a:fld id="{D1407C4A-7E44-4EF4-ACA2-E29F9BF7E803}" type="datetimeFigureOut">
               <a:rPr lang="en-US" smtClean="0"/>
-              <a:t>4/15/2018</a:t>
+              <a:t>4/16/2018</a:t>
             </a:fld>
             <a:endParaRPr lang="en-US"/>
           </a:p>
@@ -4439,7 +4445,7 @@
           <a:p>
             <a:fld id="{D1407C4A-7E44-4EF4-ACA2-E29F9BF7E803}" type="datetimeFigureOut">
               <a:rPr lang="en-US" smtClean="0"/>
-              <a:t>4/15/2018</a:t>
+              <a:t>4/16/2018</a:t>
             </a:fld>
             <a:endParaRPr lang="en-US"/>
           </a:p>
@@ -4690,7 +4696,7 @@
           <a:p>
             <a:fld id="{D1407C4A-7E44-4EF4-ACA2-E29F9BF7E803}" type="datetimeFigureOut">
               <a:rPr lang="en-US" smtClean="0"/>
-              <a:t>4/15/2018</a:t>
+              <a:t>4/16/2018</a:t>
             </a:fld>
             <a:endParaRPr lang="en-US"/>
           </a:p>
@@ -4977,7 +4983,7 @@
           <a:p>
             <a:fld id="{D1407C4A-7E44-4EF4-ACA2-E29F9BF7E803}" type="datetimeFigureOut">
               <a:rPr lang="en-US" smtClean="0"/>
-              <a:t>4/15/2018</a:t>
+              <a:t>4/16/2018</a:t>
             </a:fld>
             <a:endParaRPr lang="en-US"/>
           </a:p>
@@ -5190,7 +5196,7 @@
           <a:p>
             <a:fld id="{D1407C4A-7E44-4EF4-ACA2-E29F9BF7E803}" type="datetimeFigureOut">
               <a:rPr lang="en-US" smtClean="0"/>
-              <a:t>4/15/2018</a:t>
+              <a:t>4/16/2018</a:t>
             </a:fld>
             <a:endParaRPr lang="en-US"/>
           </a:p>
@@ -5827,12 +5833,67 @@
           </a:p>
         </p:txBody>
       </p:sp>
+      <p:sp>
+        <p:nvSpPr>
+          <p:cNvPr id="7" name="Content Placeholder 6">
+            <a:extLst>
+              <a:ext uri="{FF2B5EF4-FFF2-40B4-BE49-F238E27FC236}">
+                <a16:creationId xmlns:a16="http://schemas.microsoft.com/office/drawing/2014/main" id="{2658E8C7-6DA7-4454-9291-70DEC6952567}"/>
+              </a:ext>
+            </a:extLst>
+          </p:cNvPr>
+          <p:cNvSpPr>
+            <a:spLocks noGrp="1"/>
+          </p:cNvSpPr>
+          <p:nvPr>
+            <p:ph idx="1"/>
+          </p:nvPr>
+        </p:nvSpPr>
+        <p:spPr/>
+        <p:txBody>
+          <a:bodyPr/>
+          <a:lstStyle/>
+          <a:p>
+            <a:endParaRPr lang="en-US"/>
+          </a:p>
+        </p:txBody>
+      </p:sp>
+    </p:spTree>
+    <p:extLst>
+      <p:ext uri="{BB962C8B-B14F-4D97-AF65-F5344CB8AC3E}">
+        <p14:creationId xmlns:p14="http://schemas.microsoft.com/office/powerpoint/2010/main" val="4265927316"/>
+      </p:ext>
+    </p:extLst>
+  </p:cSld>
+  <p:clrMapOvr>
+    <a:masterClrMapping/>
+  </p:clrMapOvr>
+</p:sld>
+</file>
+
+<file path=ppt/slides/slide3.xml><?xml version="1.0" encoding="utf-8"?>
+<p:sld xmlns:a="http://schemas.openxmlformats.org/drawingml/2006/main" xmlns:r="http://schemas.openxmlformats.org/officeDocument/2006/relationships" xmlns:p="http://schemas.openxmlformats.org/presentationml/2006/main">
+  <p:cSld>
+    <p:spTree>
+      <p:nvGrpSpPr>
+        <p:cNvPr id="1" name=""/>
+        <p:cNvGrpSpPr/>
+        <p:nvPr/>
+      </p:nvGrpSpPr>
+      <p:grpSpPr>
+        <a:xfrm>
+          <a:off x="0" y="0"/>
+          <a:ext cx="0" cy="0"/>
+          <a:chOff x="0" y="0"/>
+          <a:chExt cx="0" cy="0"/>
+        </a:xfrm>
+      </p:grpSpPr>
       <p:pic>
         <p:nvPicPr>
-          <p:cNvPr id="9" name="Content Placeholder 8">
+          <p:cNvPr id="4" name="Content Placeholder 5">
             <a:extLst>
               <a:ext uri="{FF2B5EF4-FFF2-40B4-BE49-F238E27FC236}">
-                <a16:creationId xmlns:a16="http://schemas.microsoft.com/office/drawing/2014/main" id="{DD806120-A755-470C-9920-0E46D6C9E349}"/>
+                <a16:creationId xmlns:a16="http://schemas.microsoft.com/office/drawing/2014/main" id="{6BF6B771-EA6C-419C-BB20-88DEF6079EA2}"/>
               </a:ext>
             </a:extLst>
           </p:cNvPr>
@@ -5857,15 +5918,15 @@
         </p:blipFill>
         <p:spPr>
           <a:xfrm>
-            <a:off x="2161309" y="916243"/>
-            <a:ext cx="7747462" cy="5967640"/>
+            <a:off x="1367079" y="-232757"/>
+            <a:ext cx="9205543" cy="7090757"/>
           </a:xfrm>
         </p:spPr>
       </p:pic>
     </p:spTree>
     <p:extLst>
       <p:ext uri="{BB962C8B-B14F-4D97-AF65-F5344CB8AC3E}">
-        <p14:creationId xmlns:p14="http://schemas.microsoft.com/office/powerpoint/2010/main" val="4265927316"/>
+        <p14:creationId xmlns:p14="http://schemas.microsoft.com/office/powerpoint/2010/main" val="2700367894"/>
       </p:ext>
     </p:extLst>
   </p:cSld>
@@ -5875,7 +5936,7 @@
 </p:sld>
 </file>
 
-<file path=ppt/slides/slide3.xml><?xml version="1.0" encoding="utf-8"?>
+<file path=ppt/slides/slide4.xml><?xml version="1.0" encoding="utf-8"?>
 <p:sld xmlns:a="http://schemas.openxmlformats.org/drawingml/2006/main" xmlns:r="http://schemas.openxmlformats.org/officeDocument/2006/relationships" xmlns:p="http://schemas.openxmlformats.org/presentationml/2006/main">
   <p:cSld>
     <p:spTree>

</xml_diff>